<commit_message>
merge tim and elise
</commit_message>
<xml_diff>
--- a/presentatie - 19 april.pptx
+++ b/presentatie - 19 april.pptx
@@ -254,7 +254,7 @@
           <a:p>
             <a:fld id="{86680C0C-85DF-417F-8238-DB0D15743621}" type="datetimeFigureOut">
               <a:rPr lang="en-GB" smtClean="0"/>
-              <a:t>16/04/2020</a:t>
+              <a:t>17/04/2020</a:t>
             </a:fld>
             <a:endParaRPr lang="en-GB"/>
           </a:p>
@@ -568,7 +568,39 @@
           <a:p>
             <a:r>
               <a:rPr lang="nl-BE" dirty="0"/>
-              <a:t>Het uiteindelijke doel van mijn thesis is om een gezondheidsapplicatie te ontwikkelen die de gebruikers een op maat gemaakte gezonde levensstijl aanleert. </a:t>
+              <a:t>Hallo master en 1</a:t>
+            </a:r>
+            <a:r>
+              <a:rPr lang="nl-BE" baseline="30000" dirty="0"/>
+              <a:t>e</a:t>
+            </a:r>
+            <a:r>
+              <a:rPr lang="nl-BE" dirty="0"/>
+              <a:t> bachelor studenten,</a:t>
+            </a:r>
+          </a:p>
+          <a:p>
+            <a:r>
+              <a:rPr lang="nl-BE" dirty="0"/>
+              <a:t>Graag zou ik jullie mijn boeiend thesis onderwerp voorstellen.</a:t>
+            </a:r>
+          </a:p>
+          <a:p>
+            <a:r>
+              <a:rPr lang="nl-BE" dirty="0"/>
+              <a:t>Velen van jullie zullen later, net zoals een groot deel van de samenleving, een prominent zittend beroep uitvoeren.</a:t>
+            </a:r>
+          </a:p>
+          <a:p>
+            <a:r>
+              <a:rPr lang="nl-BE" dirty="0"/>
+              <a:t>Dit heeft zo zijn gevolgen met betrekking tot de algemene gezondheid. </a:t>
+            </a:r>
+          </a:p>
+          <a:p>
+            <a:r>
+              <a:rPr lang="nl-BE" dirty="0"/>
+              <a:t>Het uiteindelijke doel van mijn thesis is daarom om een gezondheidsapplicatie te ontwikkelen die de gebruikers een op maat gemaakte gezonde levensstijl aanleert. </a:t>
             </a:r>
           </a:p>
           <a:p>
@@ -580,7 +612,7 @@
           <a:p>
             <a:r>
               <a:rPr lang="nl-BE" dirty="0"/>
-              <a:t>Vaak zijn deze aanbevelingen statisch en houden ze geen rekening met persoonlijke conditie van de gebruiker.</a:t>
+              <a:t>Vaak zijn deze aanbevelingen echter statisch en houden ze geen rekening met de persoonlijke conditie van de gebruiker.</a:t>
             </a:r>
           </a:p>
           <a:p>
@@ -592,7 +624,7 @@
           <a:p>
             <a:r>
               <a:rPr lang="nl-BE" dirty="0"/>
-              <a:t>Deze thesis kiest ervoor om </a:t>
+              <a:t>Deze thesis kiest ervoor om te focussen </a:t>
             </a:r>
             <a:r>
               <a:rPr lang="nl-BE" dirty="0" err="1"/>
@@ -600,7 +632,7 @@
             </a:r>
             <a:r>
               <a:rPr lang="nl-BE" dirty="0"/>
-              <a:t> skipping te gebruiken als aanbevelingsmiddel aangezien dit de ideale sport is om conditie te kweken.</a:t>
+              <a:t> skipping als aanbevelingsmiddel aangezien dit de ideale sport is om een goede conditie te kweken.</a:t>
             </a:r>
           </a:p>
         </p:txBody>
@@ -893,7 +925,7 @@
           <a:p>
             <a:r>
               <a:rPr lang="nl-BE" dirty="0"/>
-              <a:t>Deze moet echter wel eerst nog </a:t>
+              <a:t>De data moet echter wel eerst nog </a:t>
             </a:r>
             <a:r>
               <a:rPr lang="nl-BE" dirty="0" err="1"/>
@@ -909,15 +941,7 @@
             </a:r>
             <a:r>
               <a:rPr lang="nl-BE" dirty="0"/>
-              <a:t> samples moeten eruit gefilterd worden, alle data moet van het juiste type zijn en er moet voor gezorgd worden dat er geen </a:t>
-            </a:r>
-            <a:r>
-              <a:rPr lang="nl-BE" dirty="0" err="1"/>
-              <a:t>NaN</a:t>
-            </a:r>
-            <a:r>
-              <a:rPr lang="nl-BE" dirty="0"/>
-              <a:t> waardes zijn.</a:t>
+              <a:t> samples moeten eruit gefilterd worden, alle data moet van het juiste type zijn en er moet voor gezorgd worden dat er geen ontbrekende waardes aanwezig zijn.</a:t>
             </a:r>
           </a:p>
           <a:p>
@@ -1039,6 +1063,15 @@
               <a:t>Een neuraal netwerk is zo gebouwd zodat deze bijkomende data zelf kan geleerd worden.</a:t>
             </a:r>
           </a:p>
+          <a:p>
+            <a:endParaRPr lang="nl-BE" dirty="0"/>
+          </a:p>
+          <a:p>
+            <a:r>
+              <a:rPr lang="nl-BE" dirty="0"/>
+              <a:t>Elk van deze modellen werd getraind op de data en onderling vergeleken. Het CNN model kwam hier als de beste uit. Dit is dan ook het model dat in deze thesis gebruikt wordt.</a:t>
+            </a:r>
+          </a:p>
         </p:txBody>
       </p:sp>
       <p:sp>
@@ -1131,13 +1164,21 @@
             </a:r>
             <a:r>
               <a:rPr lang="nl-BE" dirty="0"/>
-              <a:t>. Om ervoor te zorgen dat het model beide herkend moeten beide aanwezig zijn. Ook is er een verschil in data bij veranderen van draairichting. De sprong is echter nog steeds hetzelfde, dus ook deze data moet aanwezig zijn. </a:t>
+              <a:t>. Om ervoor te zorgen dat het model beide herkend moeten beide aanwezig zijn. Ook is er een verschil in data bij veranderen van draairichting. Aangezien ook hier de sprong nog steeds hetzelfde is, moet ook deze data moet aanwezig zijn. </a:t>
             </a:r>
           </a:p>
           <a:p>
             <a:r>
               <a:rPr lang="nl-BE" dirty="0"/>
-              <a:t>De forward en backward 180 sprongen hebben een andere onderscheid. Indien de forward 180 uitgevoerd wordt in de andere draairichting bekomen we de backward 180 en omgekeerd. Er is echter een ander verschil. De 180 graden draai kan gebeuren in 2 richtingen</a:t>
+              <a:t>De forward en backward 180 sprongen hebben een andere onderscheid met betrekking tot </a:t>
+            </a:r>
+            <a:r>
+              <a:rPr lang="nl-BE" dirty="0" err="1"/>
+              <a:t>daairichting</a:t>
+            </a:r>
+            <a:r>
+              <a:rPr lang="nl-BE" dirty="0"/>
+              <a:t>. Indien de forward 180 uitgevoerd wordt in de andere draairichting bekomen we de backward 180 en omgekeerd. Er is echter een ander verschil. De 180 graden draai van zichzelf en het touw kan gebeuren in 2 richtingen.</a:t>
             </a:r>
           </a:p>
         </p:txBody>
@@ -1232,7 +1273,7 @@
             </a:r>
             <a:r>
               <a:rPr lang="nl-BE" dirty="0"/>
-              <a:t> skipping de gezondheid kan geoptimaliseerd worden. Dit door persoonlijke aanbevelingen te geven.</a:t>
+              <a:t> skipping de gezondheid kan geoptimaliseerd worden. Dit door persoonlijke aanbevelingen te geven. Volgende slides geven een beeld van de uiteindelijke gezondheidsapplicatie.</a:t>
             </a:r>
           </a:p>
         </p:txBody>
@@ -1327,7 +1368,7 @@
             </a:r>
             <a:r>
               <a:rPr lang="nl-BE" dirty="0"/>
-              <a:t> skipping bewegingen uitvoert. Er wordt ook weer gebruik gemaakt van bluetooth. Op de smartphone zal dan via het getrainde machine </a:t>
+              <a:t> skipping bewegingen uitvoert. Er wordt ook weer gebruik gemaakt van bluetooth als communicatiemiddel. Op de smartphone zal dan via het getrainde machine </a:t>
             </a:r>
             <a:r>
               <a:rPr lang="nl-BE" dirty="0" err="1"/>
@@ -1335,7 +1376,7 @@
             </a:r>
             <a:r>
               <a:rPr lang="nl-BE" dirty="0"/>
-              <a:t> model nagegaan worden welke sprongen gedaan werden en wanneer. Ook zal het inspanningsniveau berekend worden. Hierover later meer.</a:t>
+              <a:t> model nagegaan worden welke sprongen gedaan werden en op welk tijdstip. Ook zal het inspanningsniveau berekend worden. Hierover later meer.</a:t>
             </a:r>
           </a:p>
         </p:txBody>
@@ -1540,7 +1581,23 @@
           <a:p>
             <a:r>
               <a:rPr lang="nl-BE" dirty="0"/>
-              <a:t>De hartslag wordt hierbij opgedeeld in intervallen die de intensiteit aanduiden. Ook wordt gebruik gemaakt van een bovengrens. Dit is de hoogste hartslag die de gezondheid niet schaadt.</a:t>
+              <a:t>Het interval beginnend bij de </a:t>
+            </a:r>
+            <a:r>
+              <a:rPr lang="nl-BE" dirty="0" err="1"/>
+              <a:t>resting</a:t>
+            </a:r>
+            <a:r>
+              <a:rPr lang="nl-BE" dirty="0"/>
+              <a:t> heat </a:t>
+            </a:r>
+            <a:r>
+              <a:rPr lang="nl-BE" dirty="0" err="1"/>
+              <a:t>rate</a:t>
+            </a:r>
+            <a:r>
+              <a:rPr lang="nl-BE" dirty="0"/>
+              <a:t> en eindigend bij de maximale hartslag wordt hierbij opgedeeld in intervallen die de intensiteit aanduiden. De maximale hartslag is leeftijdsafhankelijk. </a:t>
             </a:r>
           </a:p>
         </p:txBody>
@@ -1627,7 +1684,7 @@
           <a:p>
             <a:r>
               <a:rPr lang="nl-BE" dirty="0"/>
-              <a:t>Vanuit de bekomen statistieken zullen persoonlijke aanbevelingen gegeven worden. Hierbij wordt data van 10 weken terug bekeken alsook de gemiddelde duur van een activiteit en het aantal sessies waarin deze werd beoefent. Met activiteit wordt 1 specifieke </a:t>
+              <a:t>Vanuit de bekomen statistieken zullen persoonlijke aanbevelingen gegeven worden. Hierbij wordt data van 10 weken terug bekeken. Uit deze data wordt de gemiddelde duur van een activiteit en het aantal sessies waarin deze werd beoefent berekend. Met activiteit wordt 1 specifieke </a:t>
             </a:r>
             <a:r>
               <a:rPr lang="nl-BE" dirty="0" err="1"/>
@@ -1644,7 +1701,7 @@
           <a:p>
             <a:r>
               <a:rPr lang="nl-BE" dirty="0"/>
-              <a:t>Verschillende aspecten maken dit systeem persoonlijk. Een eerste uit zich in het rekening houden met de persoonlijke voorkeur van een gebruiker. Door rekening te houden met het aantal sessies waarin de activiteit wordt beoefend, en dus meer gewicht te geven aan frequent beoefende bewegingen, wordt een persoonlijk aspect verwezenlijkt. Ook zal het aantal gemaakte fouten meespelen in de hoeveelheid gewicht gegeven wordt aan de activiteit.</a:t>
+              <a:t>Verschillende aspecten maken dit systeem persoonlijk. Een eerste uit zich in het aandacht geven aan de persoonlijke voorkeur van een gebruiker. Door rekening te houden met het aantal sessies waarin de activiteit wordt beoefend, en dus meer gewicht te geven aan frequent beoefende bewegingen, wordt dit persoonlijk aspect verwezenlijkt. Ook zal het aantal gemaakte fouten meespelen in de hoeveelheid gewicht die gegeven wordt aan de activiteit.</a:t>
             </a:r>
           </a:p>
           <a:p>
@@ -1738,7 +1795,60 @@
           <a:bodyPr/>
           <a:lstStyle/>
           <a:p>
-            <a:endParaRPr lang="nl-BE" dirty="0"/>
+            <a:r>
+              <a:rPr lang="nl-BE" dirty="0"/>
+              <a:t>Als eerste zullen de verschillende </a:t>
+            </a:r>
+            <a:r>
+              <a:rPr lang="nl-BE" dirty="0" err="1"/>
+              <a:t>rope</a:t>
+            </a:r>
+            <a:r>
+              <a:rPr lang="nl-BE" dirty="0"/>
+              <a:t> skipping bewegingen toegelicht worden. </a:t>
+            </a:r>
+          </a:p>
+          <a:p>
+            <a:r>
+              <a:rPr lang="nl-BE" dirty="0"/>
+              <a:t>Om met </a:t>
+            </a:r>
+            <a:r>
+              <a:rPr lang="nl-BE" dirty="0" err="1"/>
+              <a:t>rope</a:t>
+            </a:r>
+            <a:r>
+              <a:rPr lang="nl-BE" dirty="0"/>
+              <a:t> skipping bewegingen aan de slag te kunnen, moeten deze op een bepaalde manier gemeten worden. De gebruikte meetopstelling wordt dan ook besproken.</a:t>
+            </a:r>
+          </a:p>
+          <a:p>
+            <a:r>
+              <a:rPr lang="nl-BE" dirty="0"/>
+              <a:t>Via machine </a:t>
+            </a:r>
+            <a:r>
+              <a:rPr lang="nl-BE" dirty="0" err="1"/>
+              <a:t>learning</a:t>
+            </a:r>
+            <a:r>
+              <a:rPr lang="nl-BE" dirty="0"/>
+              <a:t> technieken zullen vanuit de gemeten data voorspellingen kunnen gemaakt worden met betrekking tot de werkelijke sprong.</a:t>
+            </a:r>
+          </a:p>
+          <a:p>
+            <a:r>
+              <a:rPr lang="nl-BE" dirty="0"/>
+              <a:t>Tot slot zal dit alles gegoten worden in een gezondheidsapplicatie die, aan de hand van </a:t>
+            </a:r>
+            <a:r>
+              <a:rPr lang="nl-BE" dirty="0" err="1"/>
+              <a:t>rope</a:t>
+            </a:r>
+            <a:r>
+              <a:rPr lang="nl-BE" dirty="0"/>
+              <a:t> skipping data en het inspanningsniveau tijdens het springen, persoonlijke aanbevelingen zal genereren rekening houden met de huidige gebruikerscontext.</a:t>
+            </a:r>
           </a:p>
         </p:txBody>
       </p:sp>
@@ -1824,15 +1934,7 @@
           <a:p>
             <a:r>
               <a:rPr lang="nl-BE" dirty="0"/>
-              <a:t>De applicatie is context </a:t>
-            </a:r>
-            <a:r>
-              <a:rPr lang="nl-BE" dirty="0" err="1"/>
-              <a:t>aware</a:t>
-            </a:r>
-            <a:r>
-              <a:rPr lang="nl-BE" dirty="0"/>
-              <a:t> doordat aanbevelingen gegeven worden wanneer de gebruiker te lang stilzit. Ook is er een </a:t>
+              <a:t>De applicatie is context afhankelijk doordat aanbevelingen gegeven worden wanneer de gebruiker te lang stilzit. Ook is er een </a:t>
             </a:r>
             <a:r>
               <a:rPr lang="nl-BE" dirty="0" err="1"/>
@@ -1886,6 +1988,93 @@
     <p:extLst>
       <p:ext uri="{BB962C8B-B14F-4D97-AF65-F5344CB8AC3E}">
         <p14:creationId xmlns:p14="http://schemas.microsoft.com/office/powerpoint/2010/main" val="1642469291"/>
+      </p:ext>
+    </p:extLst>
+  </p:cSld>
+  <p:clrMapOvr>
+    <a:masterClrMapping/>
+  </p:clrMapOvr>
+</p:notes>
+</file>
+
+<file path=ppt/notesSlides/notesSlide21.xml><?xml version="1.0" encoding="utf-8"?>
+<p:notes xmlns:a="http://schemas.openxmlformats.org/drawingml/2006/main" xmlns:r="http://schemas.openxmlformats.org/officeDocument/2006/relationships" xmlns:p="http://schemas.openxmlformats.org/presentationml/2006/main">
+  <p:cSld>
+    <p:spTree>
+      <p:nvGrpSpPr>
+        <p:cNvPr id="1" name=""/>
+        <p:cNvGrpSpPr/>
+        <p:nvPr/>
+      </p:nvGrpSpPr>
+      <p:grpSpPr>
+        <a:xfrm>
+          <a:off x="0" y="0"/>
+          <a:ext cx="0" cy="0"/>
+          <a:chOff x="0" y="0"/>
+          <a:chExt cx="0" cy="0"/>
+        </a:xfrm>
+      </p:grpSpPr>
+      <p:sp>
+        <p:nvSpPr>
+          <p:cNvPr id="2" name="Tijdelijke aanduiding voor dia-afbeelding 1"/>
+          <p:cNvSpPr>
+            <a:spLocks noGrp="1" noRot="1" noChangeAspect="1"/>
+          </p:cNvSpPr>
+          <p:nvPr>
+            <p:ph type="sldImg"/>
+          </p:nvPr>
+        </p:nvSpPr>
+        <p:spPr/>
+      </p:sp>
+      <p:sp>
+        <p:nvSpPr>
+          <p:cNvPr id="3" name="Tijdelijke aanduiding voor notities 2"/>
+          <p:cNvSpPr>
+            <a:spLocks noGrp="1"/>
+          </p:cNvSpPr>
+          <p:nvPr>
+            <p:ph type="body" idx="1"/>
+          </p:nvPr>
+        </p:nvSpPr>
+        <p:spPr/>
+        <p:txBody>
+          <a:bodyPr/>
+          <a:lstStyle/>
+          <a:p>
+            <a:r>
+              <a:rPr lang="nl-BE" dirty="0"/>
+              <a:t>Bedankt voor jullie aandacht.</a:t>
+            </a:r>
+          </a:p>
+        </p:txBody>
+      </p:sp>
+      <p:sp>
+        <p:nvSpPr>
+          <p:cNvPr id="4" name="Tijdelijke aanduiding voor dianummer 3"/>
+          <p:cNvSpPr>
+            <a:spLocks noGrp="1"/>
+          </p:cNvSpPr>
+          <p:nvPr>
+            <p:ph type="sldNum" sz="quarter" idx="5"/>
+          </p:nvPr>
+        </p:nvSpPr>
+        <p:spPr/>
+        <p:txBody>
+          <a:bodyPr/>
+          <a:lstStyle/>
+          <a:p>
+            <a:fld id="{539A0A48-EDB1-4AFE-B1B7-10CE2A416496}" type="slidenum">
+              <a:rPr lang="en-GB" smtClean="0"/>
+              <a:t>21</a:t>
+            </a:fld>
+            <a:endParaRPr lang="en-GB"/>
+          </a:p>
+        </p:txBody>
+      </p:sp>
+    </p:spTree>
+    <p:extLst>
+      <p:ext uri="{BB962C8B-B14F-4D97-AF65-F5344CB8AC3E}">
+        <p14:creationId xmlns:p14="http://schemas.microsoft.com/office/powerpoint/2010/main" val="1459656405"/>
       </p:ext>
     </p:extLst>
   </p:cSld>
@@ -1989,7 +2178,7 @@
             </a:pPr>
             <a:r>
               <a:rPr lang="nl-BE" dirty="0"/>
-              <a:t>Hiervoor is het noodzakelijk dat bepaalde bewegingen herkend worden.  Op die manier kan userfeedback gegeven worden per beweging. Er zal bijvoorbeeld gemeld worden hoeveel draaiingen verricht zijn tijdens een sessie en per beweging. Ook zullen fouten herkend worden.</a:t>
+              <a:t>Hiervoor is het noodzakelijk dat bepaalde bewegingen herkend worden.  Op die manier kan userfeedback gegeven worden per beweging. Er zal bijvoorbeeld gemeld worden hoeveel draaiingen verricht werden tijdens een sessie en per beweging. Ook zullen fouten herkend worden. Dit levert namelijk een extra stimulans in het trainen van de conditie.</a:t>
             </a:r>
           </a:p>
           <a:p>
@@ -2012,7 +2201,7 @@
             </a:pPr>
             <a:r>
               <a:rPr lang="nl-BE" dirty="0"/>
-              <a:t>De aanbevelingen zullen dan ook per beweging gemaakt worden.</a:t>
+              <a:t>De gebruiker heeft eveneens een duidelijk beeld van zijn/haar capaciteiten per beweging.</a:t>
             </a:r>
           </a:p>
           <a:p>
@@ -2035,53 +2224,7 @@
             </a:pPr>
             <a:r>
               <a:rPr lang="nl-BE" dirty="0"/>
-              <a:t>Deze factoren zorgen voor extra aanmoediging, de gebruiker heeft namelijk een duidelijk beeld van zijn/haar capaciteiten per beweging.</a:t>
-            </a:r>
-          </a:p>
-          <a:p>
-            <a:pPr marL="0" marR="0" indent="0" algn="l" defTabSz="914400" rtl="0" eaLnBrk="1" fontAlgn="auto" latinLnBrk="0" hangingPunct="1">
-              <a:lnSpc>
-                <a:spcPct val="100000"/>
-              </a:lnSpc>
-              <a:spcBef>
-                <a:spcPts val="0"/>
-              </a:spcBef>
-              <a:spcAft>
-                <a:spcPts val="0"/>
-              </a:spcAft>
-              <a:buClrTx/>
-              <a:buSzTx/>
-              <a:buFontTx/>
-              <a:buNone/>
-              <a:tabLst/>
-              <a:defRPr/>
-            </a:pPr>
-            <a:r>
-              <a:rPr lang="nl-BE" dirty="0"/>
-              <a:t>Indien er meer fouten gemaakt worden in een bepaalde beweging, zal deze meer gewicht krijgen bij het genereren van aanbevelingen.</a:t>
-            </a:r>
-          </a:p>
-          <a:p>
-            <a:pPr marL="0" marR="0" indent="0" algn="l" defTabSz="914400" rtl="0" eaLnBrk="1" fontAlgn="auto" latinLnBrk="0" hangingPunct="1">
-              <a:lnSpc>
-                <a:spcPct val="100000"/>
-              </a:lnSpc>
-              <a:spcBef>
-                <a:spcPts val="0"/>
-              </a:spcBef>
-              <a:spcAft>
-                <a:spcPts val="0"/>
-              </a:spcAft>
-              <a:buClrTx/>
-              <a:buSzTx/>
-              <a:buFontTx/>
-              <a:buNone/>
-              <a:tabLst/>
-              <a:defRPr/>
-            </a:pPr>
-            <a:r>
-              <a:rPr lang="nl-BE" dirty="0"/>
-              <a:t>De bewegingen worden gemeten via een smartwatch gedragen op de pols. Deze smartwatch heeft een </a:t>
+              <a:t>De bewegingen worden gemeten via een smartwatch gedragen op de pols. Deze smartwatch bezit over een </a:t>
             </a:r>
             <a:r>
               <a:rPr lang="nl-BE" dirty="0" err="1"/>
@@ -2089,30 +2232,15 @@
             </a:r>
             <a:r>
               <a:rPr lang="nl-BE" dirty="0"/>
-              <a:t> waardoor aan een frequentie van 52 Hz versnellingsvectoren binnenkomen.</a:t>
-            </a:r>
-          </a:p>
-          <a:p>
-            <a:pPr marL="0" marR="0" indent="0" algn="l" defTabSz="914400" rtl="0" eaLnBrk="1" fontAlgn="auto" latinLnBrk="0" hangingPunct="1">
-              <a:lnSpc>
-                <a:spcPct val="100000"/>
-              </a:lnSpc>
-              <a:spcBef>
-                <a:spcPts val="0"/>
-              </a:spcBef>
-              <a:spcAft>
-                <a:spcPts val="0"/>
-              </a:spcAft>
-              <a:buClrTx/>
-              <a:buSzTx/>
-              <a:buFontTx/>
-              <a:buNone/>
-              <a:tabLst/>
-              <a:defRPr/>
-            </a:pPr>
+              <a:t> waarmee aan een frequentie van 52 Hz </a:t>
+            </a:r>
+            <a:r>
+              <a:rPr lang="nl-BE" dirty="0" err="1"/>
+              <a:t>accelerometer</a:t>
+            </a:r>
             <a:r>
               <a:rPr lang="nl-BE" dirty="0"/>
-              <a:t>Op die manier kunnen persoonlijke aanbevelingen gegeven worden. </a:t>
+              <a:t> data gemeten wordt.</a:t>
             </a:r>
           </a:p>
           <a:p>
@@ -2240,9 +2368,49 @@
           <a:bodyPr/>
           <a:lstStyle/>
           <a:p>
+            <a:pPr marL="0" marR="0" lvl="0" indent="0" algn="l" defTabSz="914400" rtl="0" eaLnBrk="1" fontAlgn="auto" latinLnBrk="0" hangingPunct="1">
+              <a:lnSpc>
+                <a:spcPct val="100000"/>
+              </a:lnSpc>
+              <a:spcBef>
+                <a:spcPts val="0"/>
+              </a:spcBef>
+              <a:spcAft>
+                <a:spcPts val="0"/>
+              </a:spcAft>
+              <a:buClrTx/>
+              <a:buSzTx/>
+              <a:buFontTx/>
+              <a:buNone/>
+              <a:tabLst/>
+              <a:defRPr/>
+            </a:pPr>
             <a:r>
               <a:rPr lang="nl-BE" dirty="0"/>
-              <a:t>Op deze grafieken is te zien hoe de versnellingsvector verandert volgens de x, y en </a:t>
+              <a:t>Een eerste beweging is springen met en zonder tussensprong.</a:t>
+            </a:r>
+          </a:p>
+          <a:p>
+            <a:pPr marL="0" marR="0" lvl="0" indent="0" algn="l" defTabSz="914400" rtl="0" eaLnBrk="1" fontAlgn="auto" latinLnBrk="0" hangingPunct="1">
+              <a:lnSpc>
+                <a:spcPct val="100000"/>
+              </a:lnSpc>
+              <a:spcBef>
+                <a:spcPts val="0"/>
+              </a:spcBef>
+              <a:spcAft>
+                <a:spcPts val="0"/>
+              </a:spcAft>
+              <a:buClrTx/>
+              <a:buSzTx/>
+              <a:buFontTx/>
+              <a:buNone/>
+              <a:tabLst/>
+              <a:defRPr/>
+            </a:pPr>
+            <a:r>
+              <a:rPr lang="nl-BE" dirty="0"/>
+              <a:t>De grafieken geven weer hoe de versnellingsvector verandert volgens de x, y en </a:t>
             </a:r>
             <a:r>
               <a:rPr lang="nl-BE" dirty="0" err="1"/>
@@ -2254,24 +2422,50 @@
             </a:r>
           </a:p>
           <a:p>
+            <a:pPr marL="0" marR="0" lvl="0" indent="0" algn="l" defTabSz="914400" rtl="0" eaLnBrk="1" fontAlgn="auto" latinLnBrk="0" hangingPunct="1">
+              <a:lnSpc>
+                <a:spcPct val="100000"/>
+              </a:lnSpc>
+              <a:spcBef>
+                <a:spcPts val="0"/>
+              </a:spcBef>
+              <a:spcAft>
+                <a:spcPts val="0"/>
+              </a:spcAft>
+              <a:buClrTx/>
+              <a:buSzTx/>
+              <a:buFontTx/>
+              <a:buNone/>
+              <a:tabLst/>
+              <a:defRPr/>
+            </a:pPr>
+            <a:endParaRPr lang="nl-BE" dirty="0"/>
+          </a:p>
+          <a:p>
+            <a:pPr marL="0" marR="0" lvl="0" indent="0" algn="l" defTabSz="914400" rtl="0" eaLnBrk="1" fontAlgn="auto" latinLnBrk="0" hangingPunct="1">
+              <a:lnSpc>
+                <a:spcPct val="100000"/>
+              </a:lnSpc>
+              <a:spcBef>
+                <a:spcPts val="0"/>
+              </a:spcBef>
+              <a:spcAft>
+                <a:spcPts val="0"/>
+              </a:spcAft>
+              <a:buClrTx/>
+              <a:buSzTx/>
+              <a:buFontTx/>
+              <a:buNone/>
+              <a:tabLst/>
+              <a:defRPr/>
+            </a:pPr>
             <a:r>
               <a:rPr lang="nl-BE" dirty="0"/>
-              <a:t>Aangezien deze data later zal gebruikt worden als input voor het machine </a:t>
-            </a:r>
-            <a:r>
-              <a:rPr lang="nl-BE" dirty="0" err="1"/>
-              <a:t>learning</a:t>
-            </a:r>
-            <a:r>
-              <a:rPr lang="nl-BE" dirty="0"/>
-              <a:t> model, is het nodig om te weten of er een duidelijk verschil tussen de verschillende bewegingen.</a:t>
-            </a:r>
-          </a:p>
-          <a:p>
-            <a:r>
-              <a:rPr lang="nl-BE" dirty="0"/>
-              <a:t>Deze grafieken geven springen met en zonder tussensprong weer. Zoals te zien is er wel degelijk een onderscheid.</a:t>
-            </a:r>
+              <a:t>Zoals te zien is, is er wel degelijk een onderscheid tussen de 2 sprongen wat ook nodig is indien nagenoeg perfecte herkenning van een beweging vereist is.</a:t>
+            </a:r>
+          </a:p>
+          <a:p>
+            <a:endParaRPr lang="nl-BE" dirty="0"/>
           </a:p>
         </p:txBody>
       </p:sp>
@@ -2357,7 +2551,13 @@
           <a:p>
             <a:r>
               <a:rPr lang="nl-BE" dirty="0"/>
-              <a:t>Zoals te zien op de figuur is een cross over en beweging gedaan door te springen met de armen </a:t>
+              <a:t>Een tweede sprong is de cross over.</a:t>
+            </a:r>
+          </a:p>
+          <a:p>
+            <a:r>
+              <a:rPr lang="nl-BE" dirty="0"/>
+              <a:t>Zoals te zien op de figuur is een cross over een beweging die uitgevoerd wordt met de armen </a:t>
             </a:r>
             <a:r>
               <a:rPr lang="nl-BE" dirty="0" err="1"/>
@@ -2460,7 +2660,7 @@
           <a:p>
             <a:r>
               <a:rPr lang="nl-BE" dirty="0"/>
-              <a:t>De side swing beweging wordt gedaan door het touw langs beide kanten van het lichaam te bewegen in een draaiende beweging. Deze beweging wordt vaak gebruikt als overgang tussen 2 andere. Ook hier is een onderscheid merkbaar.</a:t>
+              <a:t>De side swing beweging wordt gedaan door het touw langs beide kanten van het lichaam te bewegen in een draaiende beweging. De side swing wordt vaak gebruikt als overgang tussen 2 andere sprongen. Ook deze grafiek onderscheidt zicht van de voorgaande.</a:t>
             </a:r>
           </a:p>
         </p:txBody>
@@ -2547,7 +2747,15 @@
           <a:p>
             <a:r>
               <a:rPr lang="nl-BE" dirty="0"/>
-              <a:t>Forward 180 is een andere overgangsbeweging. Hierbij zal de springer via een halve side swing zichzelf en het touw 180 graden draaien. Bij de forward 180 wordt begonnen met een voorwaartse sprong en eindigt men met een achterwaartse sprong. De grafiek geeft het verloop weer en toont dat dit verschillend is.</a:t>
+              <a:t>Forward 180 is nog een overgangsbeweging. Hierbij zal de springer via een halve side swing zichzelf en het touw 180 graden draaien. Bij de forward 180 wordt begonnen met een voorwaartse sprong en eindigt men met een achterwaartse sprong. Deze overgangsbeweging toont gelijkenissen met een side swing wat ook logisch is aangezien de side swing beweging verweven zit in de forward 180. Om dit onderscheid te kunnen maken moet gebruik gemaakt worden van intensieve </a:t>
+            </a:r>
+            <a:r>
+              <a:rPr lang="nl-BE" dirty="0" err="1"/>
+              <a:t>finetuning</a:t>
+            </a:r>
+            <a:r>
+              <a:rPr lang="nl-BE" dirty="0"/>
+              <a:t>.</a:t>
             </a:r>
           </a:p>
         </p:txBody>
@@ -2634,7 +2842,16 @@
           <a:p>
             <a:r>
               <a:rPr lang="nl-BE" dirty="0"/>
-              <a:t>De backward 180 is hetzelfde principe als de voorwaartse variant. Alleen zal nu begonnen worden met achterwaarts springen. De verplaatsing van het touw gebeurd ook op een andere manier. De overgang gebeurt niet meer via een halve side swing. De springer zal, wanneer het touw voor hem in de lucht komt, zichzelf en het touw 180 graden draaien waarna de richting van springen wordt omgekeerd.</a:t>
+              <a:t>Backward 180 volgt hetzelfde principe als zijn voorwaartse variant. Alleen zal nu begonnen worden met achterwaarts springen. De verplaatsing van het touw gebeurd dan ook op een andere manier. De overgang gebeurt niet meer via een halve side swing. De springer zal, wanneer het touw voor hem in de lucht komt, zichzelf en het touw 180 graden draaien waarna de richting van springen wordt omgekeerd. </a:t>
+            </a:r>
+          </a:p>
+          <a:p>
+            <a:endParaRPr lang="nl-BE" dirty="0"/>
+          </a:p>
+          <a:p>
+            <a:r>
+              <a:rPr lang="nl-BE" dirty="0"/>
+              <a:t>Deze beweging onderscheidt zich weer duidelijk van de rest.</a:t>
             </a:r>
           </a:p>
         </p:txBody>
@@ -2721,15 +2938,21 @@
           <a:p>
             <a:r>
               <a:rPr lang="nl-BE" dirty="0"/>
-              <a:t>Om deze bewegingen te kunnen detecteren is dus </a:t>
+              <a:t>Enige vorm van data is noodzakelijk om de bewegingen te detecteren. </a:t>
             </a:r>
             <a:r>
               <a:rPr lang="nl-BE" dirty="0" err="1"/>
-              <a:t>accelerometerdata</a:t>
+              <a:t>Accelerometerdata</a:t>
             </a:r>
             <a:r>
               <a:rPr lang="nl-BE" dirty="0"/>
-              <a:t> noodzakelijk.  Bewegingen tijdens het </a:t>
+              <a:t> is hierbij de meest voor de hand liggende keuze. Andere opties zijn: gyroscoopdata, hartslagdata…  </a:t>
+            </a:r>
+          </a:p>
+          <a:p>
+            <a:r>
+              <a:rPr lang="nl-BE" dirty="0"/>
+              <a:t>Bewegingen tijdens het </a:t>
             </a:r>
             <a:r>
               <a:rPr lang="nl-BE" dirty="0" err="1"/>
@@ -2737,7 +2960,7 @@
             </a:r>
             <a:r>
               <a:rPr lang="nl-BE" dirty="0"/>
-              <a:t> skippen worden vooral veroorzaakt door korte en lange polsbewegingen. Dit wordt best gemeten via een smartwatch bevestigd aan de linker of rechterpols.</a:t>
+              <a:t> skippen worden vooral veroorzaakt door korte en lange polsbewegingen. Een smartwatch, bevestigd aan de linker of rechterpols, kan dit zeer goed detecteren.</a:t>
             </a:r>
           </a:p>
           <a:p>
@@ -2834,7 +3057,7 @@
           <a:p>
             <a:fld id="{5A24147F-ED97-47AF-A1B3-C82A179CF7F3}" type="datetime1">
               <a:rPr lang="nl-NL" smtClean="0"/>
-              <a:t>16-4-2020</a:t>
+              <a:t>17-4-2020</a:t>
             </a:fld>
             <a:endParaRPr lang="en-GB"/>
           </a:p>
@@ -3792,7 +4015,7 @@
           <a:p>
             <a:fld id="{25470885-0B31-4E06-AE71-7E16801F2838}" type="datetime1">
               <a:rPr lang="nl-BE" noProof="0" smtClean="0"/>
-              <a:t>16/04/2020</a:t>
+              <a:t>17/04/2020</a:t>
             </a:fld>
             <a:endParaRPr lang="nl-BE" noProof="0" dirty="0"/>
           </a:p>
@@ -3910,7 +4133,7 @@
           <a:p>
             <a:fld id="{E7410F60-8C93-4C37-B51A-4DDAE36F7E9B}" type="datetime1">
               <a:rPr lang="nl-BE" noProof="0" smtClean="0"/>
-              <a:t>16/04/2020</a:t>
+              <a:t>17/04/2020</a:t>
             </a:fld>
             <a:endParaRPr lang="nl-BE" noProof="0" dirty="0"/>
           </a:p>
@@ -4189,7 +4412,7 @@
           <a:p>
             <a:fld id="{656594B6-17DF-4759-A7A5-128AFEA77F2C}" type="datetime1">
               <a:rPr lang="nl-BE" noProof="0" smtClean="0"/>
-              <a:t>16/04/2020</a:t>
+              <a:t>17/04/2020</a:t>
             </a:fld>
             <a:endParaRPr lang="nl-BE" noProof="0" dirty="0"/>
           </a:p>
@@ -4330,7 +4553,7 @@
           <a:p>
             <a:fld id="{66A81384-1200-4D40-BEF0-3A17A1F906F4}" type="datetime1">
               <a:rPr lang="nl-NL" noProof="0" smtClean="0"/>
-              <a:t>16-4-2020</a:t>
+              <a:t>17-4-2020</a:t>
             </a:fld>
             <a:endParaRPr lang="nl-NL" noProof="0" dirty="0"/>
           </a:p>
@@ -4840,7 +5063,7 @@
           <a:p>
             <a:fld id="{66A81384-1200-4D40-BEF0-3A17A1F906F4}" type="datetime1">
               <a:rPr lang="nl-NL" noProof="0" smtClean="0"/>
-              <a:t>16-4-2020</a:t>
+              <a:t>17-4-2020</a:t>
             </a:fld>
             <a:endParaRPr lang="nl-NL" noProof="0" dirty="0"/>
           </a:p>
@@ -5126,7 +5349,7 @@
           <a:p>
             <a:fld id="{FA870D1A-A3AB-4E9F-892E-C45B5A80FDBF}" type="datetime1">
               <a:rPr lang="nl-BE" noProof="0" smtClean="0"/>
-              <a:t>16/04/2020</a:t>
+              <a:t>17/04/2020</a:t>
             </a:fld>
             <a:endParaRPr lang="nl-BE" noProof="0" dirty="0"/>
           </a:p>
@@ -7006,22 +7229,22 @@
               <a:buChar char="•"/>
             </a:pPr>
             <a:r>
-              <a:rPr lang="nl-BE" sz="3200" dirty="0" err="1"/>
+              <a:rPr lang="nl-BE" sz="3200" b="1" dirty="0" err="1"/>
               <a:t>Convolutional</a:t>
             </a:r>
             <a:r>
-              <a:rPr lang="nl-BE" sz="3200" dirty="0"/>
+              <a:rPr lang="nl-BE" sz="3200" b="1" dirty="0"/>
               <a:t> </a:t>
             </a:r>
             <a:r>
-              <a:rPr lang="nl-BE" sz="3200" dirty="0" err="1"/>
+              <a:rPr lang="nl-BE" sz="3200" b="1" dirty="0" err="1"/>
               <a:t>Neural</a:t>
             </a:r>
             <a:r>
-              <a:rPr lang="nl-BE" sz="3200" dirty="0"/>
+              <a:rPr lang="nl-BE" sz="3200" b="1" dirty="0"/>
               <a:t> Network (CNN)</a:t>
             </a:r>
-            <a:endParaRPr lang="nl-BE" sz="4800" dirty="0"/>
+            <a:endParaRPr lang="nl-BE" sz="4800" b="1" dirty="0"/>
           </a:p>
         </p:txBody>
       </p:sp>
@@ -9283,7 +9506,7 @@
           <p:nvPr/>
         </p:nvPicPr>
         <p:blipFill>
-          <a:blip r:embed="rId2">
+          <a:blip r:embed="rId3">
             <a:extLst>
               <a:ext uri="{28A0092B-C50C-407E-A947-70E740481C1C}">
                 <a14:useLocalDpi xmlns:a14="http://schemas.microsoft.com/office/drawing/2010/main" val="0"/>
@@ -9313,7 +9536,7 @@
           <p:nvPr/>
         </p:nvPicPr>
         <p:blipFill>
-          <a:blip r:embed="rId3">
+          <a:blip r:embed="rId4">
             <a:extLst>
               <a:ext uri="{28A0092B-C50C-407E-A947-70E740481C1C}">
                 <a14:useLocalDpi xmlns:a14="http://schemas.microsoft.com/office/drawing/2010/main" val="0"/>
@@ -9343,7 +9566,7 @@
           <p:nvPr/>
         </p:nvPicPr>
         <p:blipFill>
-          <a:blip r:embed="rId4">
+          <a:blip r:embed="rId5">
             <a:extLst>
               <a:ext uri="{28A0092B-C50C-407E-A947-70E740481C1C}">
                 <a14:useLocalDpi xmlns:a14="http://schemas.microsoft.com/office/drawing/2010/main" val="0"/>
@@ -9373,7 +9596,7 @@
           <p:nvPr/>
         </p:nvPicPr>
         <p:blipFill>
-          <a:blip r:embed="rId5">
+          <a:blip r:embed="rId6">
             <a:extLst>
               <a:ext uri="{28A0092B-C50C-407E-A947-70E740481C1C}">
                 <a14:useLocalDpi xmlns:a14="http://schemas.microsoft.com/office/drawing/2010/main" val="0"/>
@@ -12078,21 +12301,6 @@
 </file>
 
 <file path=customXml/item1.xml><?xml version="1.0" encoding="utf-8"?>
-<p:properties xmlns:p="http://schemas.microsoft.com/office/2006/metadata/properties" xmlns:xsi="http://www.w3.org/2001/XMLSchema-instance" xmlns:pc="http://schemas.microsoft.com/office/infopath/2007/PartnerControls">
-  <documentManagement/>
-</p:properties>
-</file>
-
-<file path=customXml/item2.xml><?xml version="1.0" encoding="utf-8"?>
-<?mso-contentType ?>
-<FormTemplates xmlns="http://schemas.microsoft.com/sharepoint/v3/contenttype/forms">
-  <Display>DocumentLibraryForm</Display>
-  <Edit>DocumentLibraryForm</Edit>
-  <New>DocumentLibraryForm</New>
-</FormTemplates>
-</file>
-
-<file path=customXml/item3.xml><?xml version="1.0" encoding="utf-8"?>
 <ct:contentTypeSchema xmlns:ct="http://schemas.microsoft.com/office/2006/metadata/contentType" xmlns:ma="http://schemas.microsoft.com/office/2006/metadata/properties/metaAttributes" ct:_="" ma:_="" ma:contentTypeName="Document" ma:contentTypeID="0x0101006485FDDAC6B575409C31AC848C388A85" ma:contentTypeVersion="" ma:contentTypeDescription="Een nieuw document maken." ma:contentTypeScope="" ma:versionID="af1196157f6ce1f05c24b0f61ce6f714">
   <xsd:schema xmlns:xsd="http://www.w3.org/2001/XMLSchema" xmlns:xs="http://www.w3.org/2001/XMLSchema" xmlns:p="http://schemas.microsoft.com/office/2006/metadata/properties" targetNamespace="http://schemas.microsoft.com/office/2006/metadata/properties" ma:root="true" ma:fieldsID="ded2a6fdfcb71de048e140027f1bc31d">
     <xsd:element name="properties">
@@ -12206,17 +12414,33 @@
 </ct:contentTypeSchema>
 </file>
 
+<file path=customXml/item2.xml><?xml version="1.0" encoding="utf-8"?>
+<?mso-contentType ?>
+<FormTemplates xmlns="http://schemas.microsoft.com/sharepoint/v3/contenttype/forms">
+  <Display>DocumentLibraryForm</Display>
+  <Edit>DocumentLibraryForm</Edit>
+  <New>DocumentLibraryForm</New>
+</FormTemplates>
+</file>
+
+<file path=customXml/item3.xml><?xml version="1.0" encoding="utf-8"?>
+<p:properties xmlns:p="http://schemas.microsoft.com/office/2006/metadata/properties" xmlns:xsi="http://www.w3.org/2001/XMLSchema-instance" xmlns:pc="http://schemas.microsoft.com/office/infopath/2007/PartnerControls">
+  <documentManagement/>
+</p:properties>
+</file>
+
 <file path=customXml/itemProps1.xml><?xml version="1.0" encoding="utf-8"?>
-<ds:datastoreItem xmlns:ds="http://schemas.openxmlformats.org/officeDocument/2006/customXml" ds:itemID="{04AF6CB7-2A18-4264-AB21-4901BBA09C44}">
+<ds:datastoreItem xmlns:ds="http://schemas.openxmlformats.org/officeDocument/2006/customXml" ds:itemID="{61CD111F-BAB6-4F2E-9651-10398B145E62}">
   <ds:schemaRefs>
-    <ds:schemaRef ds:uri="http://purl.org/dc/dcmitype/"/>
+    <ds:schemaRef ds:uri="http://schemas.microsoft.com/office/2006/metadata/contentType"/>
+    <ds:schemaRef ds:uri="http://schemas.microsoft.com/office/2006/metadata/properties/metaAttributes"/>
+    <ds:schemaRef ds:uri="http://www.w3.org/2001/XMLSchema"/>
+    <ds:schemaRef ds:uri="http://schemas.microsoft.com/office/2006/metadata/properties"/>
+    <ds:schemaRef ds:uri="http://schemas.openxmlformats.org/package/2006/metadata/core-properties"/>
+    <ds:schemaRef ds:uri="http://purl.org/dc/elements/1.1/"/>
+    <ds:schemaRef ds:uri="http://purl.org/dc/terms/"/>
+    <ds:schemaRef ds:uri="http://schemas.microsoft.com/internal/obd"/>
     <ds:schemaRef ds:uri="http://schemas.microsoft.com/office/infopath/2007/PartnerControls"/>
-    <ds:schemaRef ds:uri="http://purl.org/dc/elements/1.1/"/>
-    <ds:schemaRef ds:uri="http://schemas.microsoft.com/office/2006/metadata/properties"/>
-    <ds:schemaRef ds:uri="http://schemas.microsoft.com/office/2006/documentManagement/types"/>
-    <ds:schemaRef ds:uri="http://purl.org/dc/terms/"/>
-    <ds:schemaRef ds:uri="http://schemas.openxmlformats.org/package/2006/metadata/core-properties"/>
-    <ds:schemaRef ds:uri="http://www.w3.org/XML/1998/namespace"/>
   </ds:schemaRefs>
 </ds:datastoreItem>
 </file>
@@ -12230,17 +12454,16 @@
 </file>
 
 <file path=customXml/itemProps3.xml><?xml version="1.0" encoding="utf-8"?>
-<ds:datastoreItem xmlns:ds="http://schemas.openxmlformats.org/officeDocument/2006/customXml" ds:itemID="{61CD111F-BAB6-4F2E-9651-10398B145E62}">
+<ds:datastoreItem xmlns:ds="http://schemas.openxmlformats.org/officeDocument/2006/customXml" ds:itemID="{04AF6CB7-2A18-4264-AB21-4901BBA09C44}">
   <ds:schemaRefs>
-    <ds:schemaRef ds:uri="http://schemas.microsoft.com/office/2006/metadata/contentType"/>
-    <ds:schemaRef ds:uri="http://schemas.microsoft.com/office/2006/metadata/properties/metaAttributes"/>
-    <ds:schemaRef ds:uri="http://www.w3.org/2001/XMLSchema"/>
+    <ds:schemaRef ds:uri="http://purl.org/dc/dcmitype/"/>
+    <ds:schemaRef ds:uri="http://schemas.microsoft.com/office/infopath/2007/PartnerControls"/>
+    <ds:schemaRef ds:uri="http://purl.org/dc/elements/1.1/"/>
     <ds:schemaRef ds:uri="http://schemas.microsoft.com/office/2006/metadata/properties"/>
+    <ds:schemaRef ds:uri="http://schemas.microsoft.com/office/2006/documentManagement/types"/>
+    <ds:schemaRef ds:uri="http://purl.org/dc/terms/"/>
     <ds:schemaRef ds:uri="http://schemas.openxmlformats.org/package/2006/metadata/core-properties"/>
-    <ds:schemaRef ds:uri="http://purl.org/dc/elements/1.1/"/>
-    <ds:schemaRef ds:uri="http://purl.org/dc/terms/"/>
-    <ds:schemaRef ds:uri="http://schemas.microsoft.com/internal/obd"/>
-    <ds:schemaRef ds:uri="http://schemas.microsoft.com/office/infopath/2007/PartnerControls"/>
+    <ds:schemaRef ds:uri="http://www.w3.org/XML/1998/namespace"/>
   </ds:schemaRefs>
 </ds:datastoreItem>
 </file>
</xml_diff>